<commit_message>
First draft for ppt
</commit_message>
<xml_diff>
--- a/FinalPresentation.pptx
+++ b/FinalPresentation.pptx
@@ -6,7 +6,15 @@
   </p:sldMasterIdLst>
   <p:sldIdLst>
     <p:sldId id="256" r:id="rId2"/>
-    <p:sldId id="257" r:id="rId3"/>
+    <p:sldId id="258" r:id="rId3"/>
+    <p:sldId id="259" r:id="rId4"/>
+    <p:sldId id="260" r:id="rId5"/>
+    <p:sldId id="261" r:id="rId6"/>
+    <p:sldId id="262" r:id="rId7"/>
+    <p:sldId id="263" r:id="rId8"/>
+    <p:sldId id="264" r:id="rId9"/>
+    <p:sldId id="265" r:id="rId10"/>
+    <p:sldId id="257" r:id="rId11"/>
   </p:sldIdLst>
   <p:sldSz cx="9144000" cy="6858000" type="screen4x3"/>
   <p:notesSz cx="7010400" cy="9296400"/>
@@ -105,6 +113,22 @@
       </a:defRPr>
     </a:lvl9pPr>
   </p:defaultTextStyle>
+  <p:extLst>
+    <p:ext uri="{EFAFB233-063F-42B5-8137-9DF3F51BA10A}">
+      <p15:sldGuideLst xmlns:p15="http://schemas.microsoft.com/office/powerpoint/2012/main">
+        <p15:guide id="1" orient="horz" pos="2160">
+          <p15:clr>
+            <a:srgbClr val="A4A3A4"/>
+          </p15:clr>
+        </p15:guide>
+        <p15:guide id="2" pos="2880">
+          <p15:clr>
+            <a:srgbClr val="A4A3A4"/>
+          </p15:clr>
+        </p15:guide>
+      </p15:sldGuideLst>
+    </p:ext>
+  </p:extLst>
 </p:presentation>
 </file>
 
@@ -303,7 +327,7 @@
             <a:fld id="{04AF466F-BDA4-4F18-9C7B-FF0A9A1B0E80}" type="datetime1">
               <a:rPr lang="en-US" smtClean="0"/>
               <a:pPr/>
-              <a:t>4/17/16</a:t>
+              <a:t>4/19/2016</a:t>
             </a:fld>
             <a:endParaRPr lang="en-US"/>
           </a:p>
@@ -470,7 +494,7 @@
             <a:fld id="{58FB4290-6522-4139-852E-05BD9E7F0D2E}" type="datetime1">
               <a:rPr lang="en-US" smtClean="0"/>
               <a:pPr/>
-              <a:t>4/17/16</a:t>
+              <a:t>4/19/2016</a:t>
             </a:fld>
             <a:endParaRPr lang="en-US"/>
           </a:p>
@@ -647,7 +671,7 @@
             <a:fld id="{AAB955F9-81EA-47C5-8059-9E5C2B437C70}" type="datetime1">
               <a:rPr lang="en-US" smtClean="0"/>
               <a:pPr/>
-              <a:t>4/17/16</a:t>
+              <a:t>4/19/2016</a:t>
             </a:fld>
             <a:endParaRPr lang="en-US"/>
           </a:p>
@@ -814,7 +838,7 @@
             <a:fld id="{1CEF607B-A47E-422C-9BEF-122CCDB7C526}" type="datetime1">
               <a:rPr lang="en-US" smtClean="0"/>
               <a:pPr/>
-              <a:t>4/17/16</a:t>
+              <a:t>4/19/2016</a:t>
             </a:fld>
             <a:endParaRPr lang="en-US"/>
           </a:p>
@@ -1057,7 +1081,7 @@
             <a:fld id="{63A9A7CB-BEE6-4F99-898E-913F06E8E125}" type="datetime1">
               <a:rPr lang="en-US" smtClean="0"/>
               <a:pPr/>
-              <a:t>4/17/16</a:t>
+              <a:t>4/19/2016</a:t>
             </a:fld>
             <a:endParaRPr lang="en-US"/>
           </a:p>
@@ -1342,7 +1366,7 @@
             <a:fld id="{B6EE300C-6FC5-4FC3-AF1A-075E4F50620D}" type="datetime1">
               <a:rPr lang="en-US" smtClean="0"/>
               <a:pPr/>
-              <a:t>4/17/16</a:t>
+              <a:t>4/19/2016</a:t>
             </a:fld>
             <a:endParaRPr lang="en-US"/>
           </a:p>
@@ -1773,7 +1797,7 @@
             <a:fld id="{F50D295D-4A77-4DEB-B04C-9F4282A8BC04}" type="datetime1">
               <a:rPr lang="en-US" smtClean="0"/>
               <a:pPr/>
-              <a:t>4/17/16</a:t>
+              <a:t>4/19/2016</a:t>
             </a:fld>
             <a:endParaRPr lang="en-US"/>
           </a:p>
@@ -1888,7 +1912,7 @@
             <a:fld id="{02B28685-4D0C-42D5-8013-B5904CD1FCBC}" type="datetime1">
               <a:rPr lang="en-US" smtClean="0"/>
               <a:pPr/>
-              <a:t>4/17/16</a:t>
+              <a:t>4/19/2016</a:t>
             </a:fld>
             <a:endParaRPr lang="en-US"/>
           </a:p>
@@ -1980,7 +2004,7 @@
             <a:fld id="{FDF226C0-9885-4BA9-BBFA-A52CBFEBB775}" type="datetime1">
               <a:rPr lang="en-US" smtClean="0"/>
               <a:pPr/>
-              <a:t>4/17/16</a:t>
+              <a:t>4/19/2016</a:t>
             </a:fld>
             <a:endParaRPr lang="en-US"/>
           </a:p>
@@ -2171,7 +2195,7 @@
             <a:fld id="{EBEE1B38-C5EB-4D66-9137-0AFE9CDEDE8F}" type="datetime1">
               <a:rPr lang="en-US" smtClean="0"/>
               <a:pPr/>
-              <a:t>4/17/16</a:t>
+              <a:t>4/19/2016</a:t>
             </a:fld>
             <a:endParaRPr lang="en-US"/>
           </a:p>
@@ -2491,7 +2515,7 @@
             <a:fld id="{327B613C-1AD7-49D3-885D-F654C5CDBAA6}" type="datetime1">
               <a:rPr lang="en-US" smtClean="0"/>
               <a:pPr/>
-              <a:t>4/17/16</a:t>
+              <a:t>4/19/2016</a:t>
             </a:fld>
             <a:endParaRPr lang="en-US" dirty="0"/>
           </a:p>
@@ -2873,12 +2897,42 @@
             <a:fld id="{327B613C-1AD7-49D3-885D-F654C5CDBAA6}" type="datetime1">
               <a:rPr lang="en-US" smtClean="0"/>
               <a:pPr/>
-              <a:t>4/17/16</a:t>
+              <a:t>4/19/2016</a:t>
             </a:fld>
             <a:endParaRPr lang="en-US" dirty="0"/>
           </a:p>
         </p:txBody>
       </p:sp>
+      <p:pic>
+        <p:nvPicPr>
+          <p:cNvPr id="9" name="Picture 8"/>
+          <p:cNvPicPr>
+            <a:picLocks noChangeAspect="1"/>
+          </p:cNvPicPr>
+          <p:nvPr userDrawn="1"/>
+        </p:nvPicPr>
+        <p:blipFill>
+          <a:blip r:embed="rId13" cstate="email">
+            <a:extLst>
+              <a:ext uri="{28A0092B-C50C-407E-A947-70E740481C1C}">
+                <a14:useLocalDpi xmlns:a14="http://schemas.microsoft.com/office/drawing/2010/main" val="0"/>
+              </a:ext>
+            </a:extLst>
+          </a:blip>
+          <a:stretch>
+            <a:fillRect/>
+          </a:stretch>
+        </p:blipFill>
+        <p:spPr>
+          <a:xfrm>
+            <a:off x="0" y="6094927"/>
+            <a:ext cx="1526146" cy="763073"/>
+          </a:xfrm>
+          <a:prstGeom prst="rect">
+            <a:avLst/>
+          </a:prstGeom>
+        </p:spPr>
+      </p:pic>
     </p:spTree>
   </p:cSld>
   <p:clrMap bg1="lt1" tx1="dk1" bg2="lt2" tx2="dk2" accent1="accent1" accent2="accent2" accent3="accent3" accent4="accent4" accent5="accent5" accent6="accent6" hlink="hlink" folHlink="folHlink"/>
@@ -3207,14 +3261,23 @@
             <p:ph type="ctrTitle"/>
           </p:nvPr>
         </p:nvSpPr>
-        <p:spPr/>
+        <p:spPr>
+          <a:xfrm>
+            <a:off x="685800" y="1233056"/>
+            <a:ext cx="7543800" cy="1884217"/>
+          </a:xfrm>
+        </p:spPr>
         <p:txBody>
           <a:bodyPr/>
           <a:lstStyle/>
           <a:p>
             <a:r>
               <a:rPr lang="en-US" b="1" dirty="0"/>
-              <a:t>Group ##</a:t>
+              <a:t>Group </a:t>
+            </a:r>
+            <a:r>
+              <a:rPr lang="en-US" b="1" dirty="0" smtClean="0"/>
+              <a:t>1</a:t>
             </a:r>
             <a:r>
               <a:rPr lang="en-US" dirty="0"/>
@@ -3224,16 +3287,9 @@
               <a:rPr lang="en-US" dirty="0"/>
             </a:br>
             <a:r>
-              <a:rPr lang="en-US" b="1" dirty="0"/>
-              <a:t>Your Project Name</a:t>
-            </a:r>
-            <a:r>
-              <a:rPr lang="en-US" dirty="0"/>
-              <a:t/>
-            </a:r>
-            <a:br>
-              <a:rPr lang="en-US" dirty="0"/>
-            </a:br>
+              <a:rPr lang="en-US" b="1" dirty="0" smtClean="0"/>
+              <a:t>Anyone There</a:t>
+            </a:r>
             <a:endParaRPr lang="en-US" dirty="0"/>
           </a:p>
         </p:txBody>
@@ -3248,15 +3304,79 @@
             <p:ph type="subTitle" idx="1"/>
           </p:nvPr>
         </p:nvSpPr>
-        <p:spPr/>
-        <p:txBody>
-          <a:bodyPr/>
+        <p:spPr>
+          <a:xfrm>
+            <a:off x="685800" y="3317184"/>
+            <a:ext cx="6461760" cy="2321616"/>
+          </a:xfrm>
+        </p:spPr>
+        <p:txBody>
+          <a:bodyPr>
+            <a:normAutofit/>
+          </a:bodyPr>
           <a:lstStyle/>
           <a:p>
             <a:r>
               <a:rPr lang="en-US" b="1" dirty="0" smtClean="0"/>
-              <a:t>Team member1, Team member 2 &amp; Team member 3</a:t>
-            </a:r>
+              <a:t>Rahul </a:t>
+            </a:r>
+            <a:r>
+              <a:rPr lang="en-US" b="1" dirty="0" err="1" smtClean="0"/>
+              <a:t>Bobhate</a:t>
+            </a:r>
+            <a:r>
+              <a:rPr lang="en-US" b="1" dirty="0" smtClean="0"/>
+              <a:t>, </a:t>
+            </a:r>
+            <a:r>
+              <a:rPr lang="en-US" b="1" dirty="0" err="1"/>
+              <a:t>H</a:t>
+            </a:r>
+            <a:r>
+              <a:rPr lang="en-US" b="1" dirty="0" err="1" smtClean="0"/>
+              <a:t>iranava</a:t>
+            </a:r>
+            <a:r>
+              <a:rPr lang="en-US" b="1" dirty="0" smtClean="0"/>
+              <a:t> Das, </a:t>
+            </a:r>
+            <a:r>
+              <a:rPr lang="en-US" b="1" dirty="0" err="1" smtClean="0"/>
+              <a:t>Sharique</a:t>
+            </a:r>
+            <a:r>
+              <a:rPr lang="en-US" b="1" dirty="0" smtClean="0"/>
+              <a:t> Hussain, Hamza Karachiwala, </a:t>
+            </a:r>
+            <a:r>
+              <a:rPr lang="en-US" b="1" dirty="0" err="1" smtClean="0"/>
+              <a:t>Suryansh</a:t>
+            </a:r>
+            <a:r>
+              <a:rPr lang="en-US" b="1" dirty="0" smtClean="0"/>
+              <a:t> Singh</a:t>
+            </a:r>
+          </a:p>
+          <a:p>
+            <a:endParaRPr lang="en-US" b="1" dirty="0"/>
+          </a:p>
+          <a:p>
+            <a:pPr lvl="0"/>
+            <a:r>
+              <a:rPr lang="en-US" b="1" i="1" u="sng" dirty="0"/>
+              <a:t>This Project is Sponsored by Google's 2016 Internet of Things (</a:t>
+            </a:r>
+            <a:r>
+              <a:rPr lang="en-US" b="1" i="1" u="sng" dirty="0" err="1"/>
+              <a:t>IoT</a:t>
+            </a:r>
+            <a:r>
+              <a:rPr lang="en-US" b="1" i="1" u="sng" dirty="0"/>
+              <a:t>) Technology Research Award Pilot</a:t>
+            </a:r>
+            <a:endParaRPr lang="en-GB" i="1" u="sng" dirty="0"/>
+          </a:p>
+          <a:p>
             <a:endParaRPr lang="en-US" dirty="0"/>
           </a:p>
         </p:txBody>
@@ -3327,6 +3447,136 @@
     <p:extLst>
       <p:ext uri="{BB962C8B-B14F-4D97-AF65-F5344CB8AC3E}">
         <p14:creationId xmlns:p14="http://schemas.microsoft.com/office/powerpoint/2010/main" val="2989275806"/>
+      </p:ext>
+    </p:extLst>
+  </p:cSld>
+  <p:clrMapOvr>
+    <a:masterClrMapping/>
+  </p:clrMapOvr>
+</p:sld>
+</file>
+
+<file path=ppt/slides/slide10.xml><?xml version="1.0" encoding="utf-8"?>
+<p:sld xmlns:a="http://schemas.openxmlformats.org/drawingml/2006/main" xmlns:r="http://schemas.openxmlformats.org/officeDocument/2006/relationships" xmlns:p="http://schemas.openxmlformats.org/presentationml/2006/main">
+  <p:cSld>
+    <p:spTree>
+      <p:nvGrpSpPr>
+        <p:cNvPr id="1" name=""/>
+        <p:cNvGrpSpPr/>
+        <p:nvPr/>
+      </p:nvGrpSpPr>
+      <p:grpSpPr>
+        <a:xfrm>
+          <a:off x="0" y="0"/>
+          <a:ext cx="0" cy="0"/>
+          <a:chOff x="0" y="0"/>
+          <a:chExt cx="0" cy="0"/>
+        </a:xfrm>
+      </p:grpSpPr>
+      <p:sp>
+        <p:nvSpPr>
+          <p:cNvPr id="2" name="Title 1"/>
+          <p:cNvSpPr>
+            <a:spLocks noGrp="1"/>
+          </p:cNvSpPr>
+          <p:nvPr>
+            <p:ph type="title"/>
+          </p:nvPr>
+        </p:nvSpPr>
+        <p:spPr/>
+        <p:txBody>
+          <a:bodyPr/>
+          <a:lstStyle/>
+          <a:p>
+            <a:r>
+              <a:rPr lang="en-US" dirty="0" smtClean="0"/>
+              <a:t>Content</a:t>
+            </a:r>
+            <a:endParaRPr lang="en-US" dirty="0"/>
+          </a:p>
+        </p:txBody>
+      </p:sp>
+      <p:sp>
+        <p:nvSpPr>
+          <p:cNvPr id="3" name="Content Placeholder 2"/>
+          <p:cNvSpPr>
+            <a:spLocks noGrp="1"/>
+          </p:cNvSpPr>
+          <p:nvPr>
+            <p:ph idx="1"/>
+          </p:nvPr>
+        </p:nvSpPr>
+        <p:spPr/>
+        <p:txBody>
+          <a:bodyPr/>
+          <a:lstStyle/>
+          <a:p>
+            <a:r>
+              <a:rPr lang="en-US" dirty="0" smtClean="0"/>
+              <a:t>Project idea: 1-2 slides</a:t>
+            </a:r>
+          </a:p>
+          <a:p>
+            <a:pPr lvl="1"/>
+            <a:r>
+              <a:rPr lang="en-US" dirty="0" smtClean="0"/>
+              <a:t>What problem are you trying to address</a:t>
+            </a:r>
+          </a:p>
+          <a:p>
+            <a:pPr lvl="1"/>
+            <a:r>
+              <a:rPr lang="en-US" dirty="0" smtClean="0"/>
+              <a:t>What is the idea of your solution</a:t>
+            </a:r>
+          </a:p>
+          <a:p>
+            <a:r>
+              <a:rPr lang="en-US" dirty="0" smtClean="0"/>
+              <a:t>Used Technology: 1 slide</a:t>
+            </a:r>
+          </a:p>
+          <a:p>
+            <a:r>
+              <a:rPr lang="en-US" dirty="0" smtClean="0"/>
+              <a:t>Architecture of the solution: 1 slide (pictorial)</a:t>
+            </a:r>
+          </a:p>
+          <a:p>
+            <a:r>
+              <a:rPr lang="en-US" dirty="0" smtClean="0"/>
+              <a:t>Any assets to showcase your project (photos, etc.): 1 slide</a:t>
+            </a:r>
+          </a:p>
+          <a:p>
+            <a:r>
+              <a:rPr lang="en-US" dirty="0" smtClean="0"/>
+              <a:t>What works? And What does not?  1 slide</a:t>
+            </a:r>
+          </a:p>
+          <a:p>
+            <a:r>
+              <a:rPr lang="en-US" dirty="0" smtClean="0"/>
+              <a:t>What business model may be utilized in connection with your project? (how can money be made from your idea?) 1 slide</a:t>
+            </a:r>
+          </a:p>
+          <a:p>
+            <a:r>
+              <a:rPr lang="en-US" dirty="0" smtClean="0"/>
+              <a:t>Finally, 2 min </a:t>
+            </a:r>
+            <a:r>
+              <a:rPr lang="en-US" smtClean="0"/>
+              <a:t>high quality video </a:t>
+            </a:r>
+            <a:endParaRPr lang="en-US" dirty="0"/>
+          </a:p>
+        </p:txBody>
+      </p:sp>
+    </p:spTree>
+    <p:extLst>
+      <p:ext uri="{BB962C8B-B14F-4D97-AF65-F5344CB8AC3E}">
+        <p14:creationId xmlns:p14="http://schemas.microsoft.com/office/powerpoint/2010/main" val="2679269164"/>
       </p:ext>
     </p:extLst>
   </p:cSld>
@@ -3370,7 +3620,7 @@
           <a:p>
             <a:r>
               <a:rPr lang="en-US" dirty="0" smtClean="0"/>
-              <a:t>Content</a:t>
+              <a:t>Why have this system</a:t>
             </a:r>
             <a:endParaRPr lang="en-US" dirty="0"/>
           </a:p>
@@ -3383,80 +3633,992 @@
             <a:spLocks noGrp="1"/>
           </p:cNvSpPr>
           <p:nvPr>
-            <p:ph idx="1"/>
-          </p:nvPr>
-        </p:nvSpPr>
-        <p:spPr/>
-        <p:txBody>
-          <a:bodyPr/>
-          <a:lstStyle/>
-          <a:p>
-            <a:r>
-              <a:rPr lang="en-US" dirty="0" smtClean="0"/>
-              <a:t>Project idea: 1-2 slides</a:t>
-            </a:r>
-          </a:p>
-          <a:p>
-            <a:pPr lvl="1"/>
-            <a:r>
-              <a:rPr lang="en-US" dirty="0" smtClean="0"/>
-              <a:t>What problem are you trying to address</a:t>
-            </a:r>
-          </a:p>
-          <a:p>
-            <a:pPr lvl="1"/>
-            <a:r>
-              <a:rPr lang="en-US" dirty="0" smtClean="0"/>
-              <a:t>What is the idea of your solution</a:t>
-            </a:r>
-          </a:p>
-          <a:p>
-            <a:r>
-              <a:rPr lang="en-US" dirty="0" smtClean="0"/>
-              <a:t>Used Technology: 1 slide</a:t>
-            </a:r>
-          </a:p>
-          <a:p>
-            <a:r>
-              <a:rPr lang="en-US" dirty="0" smtClean="0"/>
-              <a:t>Architecture of the solution: 1 slide (pictorial)</a:t>
-            </a:r>
-          </a:p>
-          <a:p>
-            <a:r>
-              <a:rPr lang="en-US" dirty="0" smtClean="0"/>
-              <a:t>Any assets to showcase your project (photos, etc.): 1 slide</a:t>
-            </a:r>
-          </a:p>
-          <a:p>
-            <a:r>
-              <a:rPr lang="en-US" dirty="0" smtClean="0"/>
-              <a:t>What works? And What does not?  1 slide</a:t>
-            </a:r>
-          </a:p>
-          <a:p>
-            <a:r>
-              <a:rPr lang="en-US" dirty="0" smtClean="0"/>
-              <a:t>What business model may be utilized in connection with your project? (how can money be made from your idea?) 1 slide</a:t>
-            </a:r>
-          </a:p>
-          <a:p>
-            <a:r>
-              <a:rPr lang="en-US" dirty="0" smtClean="0"/>
-              <a:t>Finally, 2 min </a:t>
-            </a:r>
-            <a:r>
-              <a:rPr lang="en-US" smtClean="0"/>
-              <a:t>high quality video </a:t>
-            </a:r>
-            <a:endParaRPr lang="en-US" dirty="0"/>
-          </a:p>
-        </p:txBody>
-      </p:sp>
+            <p:ph sz="half" idx="1"/>
+          </p:nvPr>
+        </p:nvSpPr>
+        <p:spPr/>
+        <p:txBody>
+          <a:bodyPr>
+            <a:normAutofit fontScale="92500" lnSpcReduction="10000"/>
+          </a:bodyPr>
+          <a:lstStyle/>
+          <a:p>
+            <a:r>
+              <a:rPr lang="en-US" sz="3200" dirty="0" smtClean="0"/>
+              <a:t>Confused at library entrance</a:t>
+            </a:r>
+          </a:p>
+          <a:p>
+            <a:r>
+              <a:rPr lang="en-US" sz="3200" dirty="0" smtClean="0"/>
+              <a:t>Looking for friends</a:t>
+            </a:r>
+          </a:p>
+          <a:p>
+            <a:r>
+              <a:rPr lang="en-US" sz="3200" dirty="0" smtClean="0"/>
+              <a:t>Looking for place</a:t>
+            </a:r>
+          </a:p>
+          <a:p>
+            <a:r>
+              <a:rPr lang="en-US" sz="3200" dirty="0" smtClean="0"/>
+              <a:t>Need help with a course</a:t>
+            </a:r>
+          </a:p>
+          <a:p>
+            <a:r>
+              <a:rPr lang="en-US" sz="3200" dirty="0" smtClean="0"/>
+              <a:t>Hate relying on WhatsApp replies (only getting blue ticks)</a:t>
+            </a:r>
+            <a:endParaRPr lang="en-US" sz="3200" dirty="0"/>
+          </a:p>
+        </p:txBody>
+      </p:sp>
+      <p:pic>
+        <p:nvPicPr>
+          <p:cNvPr id="5" name="Content Placeholder 4"/>
+          <p:cNvPicPr>
+            <a:picLocks noGrp="1" noChangeAspect="1"/>
+          </p:cNvPicPr>
+          <p:nvPr>
+            <p:ph sz="half" idx="2"/>
+          </p:nvPr>
+        </p:nvPicPr>
+        <p:blipFill>
+          <a:blip r:embed="rId2" cstate="email">
+            <a:extLst>
+              <a:ext uri="{28A0092B-C50C-407E-A947-70E740481C1C}">
+                <a14:useLocalDpi xmlns:a14="http://schemas.microsoft.com/office/drawing/2010/main" val="0"/>
+              </a:ext>
+            </a:extLst>
+          </a:blip>
+          <a:stretch>
+            <a:fillRect/>
+          </a:stretch>
+        </p:blipFill>
+        <p:spPr>
+          <a:xfrm rot="1200362">
+            <a:off x="4285835" y="1830229"/>
+            <a:ext cx="4082418" cy="4002213"/>
+          </a:xfrm>
+        </p:spPr>
+      </p:pic>
     </p:spTree>
     <p:extLst>
       <p:ext uri="{BB962C8B-B14F-4D97-AF65-F5344CB8AC3E}">
-        <p14:creationId xmlns:p14="http://schemas.microsoft.com/office/powerpoint/2010/main" val="2679269164"/>
+        <p14:creationId xmlns:p14="http://schemas.microsoft.com/office/powerpoint/2010/main" val="2943540226"/>
+      </p:ext>
+    </p:extLst>
+  </p:cSld>
+  <p:clrMapOvr>
+    <a:masterClrMapping/>
+  </p:clrMapOvr>
+</p:sld>
+</file>
+
+<file path=ppt/slides/slide3.xml><?xml version="1.0" encoding="utf-8"?>
+<p:sld xmlns:a="http://schemas.openxmlformats.org/drawingml/2006/main" xmlns:r="http://schemas.openxmlformats.org/officeDocument/2006/relationships" xmlns:p="http://schemas.openxmlformats.org/presentationml/2006/main">
+  <p:cSld>
+    <p:spTree>
+      <p:nvGrpSpPr>
+        <p:cNvPr id="1" name=""/>
+        <p:cNvGrpSpPr/>
+        <p:nvPr/>
+      </p:nvGrpSpPr>
+      <p:grpSpPr>
+        <a:xfrm>
+          <a:off x="0" y="0"/>
+          <a:ext cx="0" cy="0"/>
+          <a:chOff x="0" y="0"/>
+          <a:chExt cx="0" cy="0"/>
+        </a:xfrm>
+      </p:grpSpPr>
+      <p:sp>
+        <p:nvSpPr>
+          <p:cNvPr id="2" name="Title 1"/>
+          <p:cNvSpPr>
+            <a:spLocks noGrp="1"/>
+          </p:cNvSpPr>
+          <p:nvPr>
+            <p:ph type="title"/>
+          </p:nvPr>
+        </p:nvSpPr>
+        <p:spPr/>
+        <p:txBody>
+          <a:bodyPr/>
+          <a:lstStyle/>
+          <a:p>
+            <a:r>
+              <a:rPr lang="en-US" dirty="0" smtClean="0"/>
+              <a:t>The Library should help us</a:t>
+            </a:r>
+            <a:endParaRPr lang="en-US" dirty="0"/>
+          </a:p>
+        </p:txBody>
+      </p:sp>
+      <p:sp>
+        <p:nvSpPr>
+          <p:cNvPr id="3" name="Content Placeholder 2"/>
+          <p:cNvSpPr>
+            <a:spLocks noGrp="1"/>
+          </p:cNvSpPr>
+          <p:nvPr>
+            <p:ph idx="1"/>
+          </p:nvPr>
+        </p:nvSpPr>
+        <p:spPr/>
+        <p:txBody>
+          <a:bodyPr>
+            <a:normAutofit/>
+          </a:bodyPr>
+          <a:lstStyle/>
+          <a:p>
+            <a:r>
+              <a:rPr lang="en-US" sz="3600" dirty="0" smtClean="0"/>
+              <a:t>It should tell us who is here</a:t>
+            </a:r>
+          </a:p>
+          <a:p>
+            <a:r>
+              <a:rPr lang="en-US" sz="3600" dirty="0" smtClean="0"/>
+              <a:t>It should tell us where there is place</a:t>
+            </a:r>
+          </a:p>
+          <a:p>
+            <a:r>
+              <a:rPr lang="en-US" sz="3600" dirty="0" smtClean="0"/>
+              <a:t>It should know about the study activities</a:t>
+            </a:r>
+          </a:p>
+          <a:p>
+            <a:r>
+              <a:rPr lang="en-US" sz="3600" dirty="0" smtClean="0"/>
+              <a:t>It should be able to guide us regarding this information</a:t>
+            </a:r>
+            <a:endParaRPr lang="en-US" sz="3600" dirty="0"/>
+          </a:p>
+        </p:txBody>
+      </p:sp>
+    </p:spTree>
+    <p:extLst>
+      <p:ext uri="{BB962C8B-B14F-4D97-AF65-F5344CB8AC3E}">
+        <p14:creationId xmlns:p14="http://schemas.microsoft.com/office/powerpoint/2010/main" val="258539454"/>
+      </p:ext>
+    </p:extLst>
+  </p:cSld>
+  <p:clrMapOvr>
+    <a:masterClrMapping/>
+  </p:clrMapOvr>
+</p:sld>
+</file>
+
+<file path=ppt/slides/slide4.xml><?xml version="1.0" encoding="utf-8"?>
+<p:sld xmlns:a="http://schemas.openxmlformats.org/drawingml/2006/main" xmlns:r="http://schemas.openxmlformats.org/officeDocument/2006/relationships" xmlns:p="http://schemas.openxmlformats.org/presentationml/2006/main">
+  <p:cSld>
+    <p:spTree>
+      <p:nvGrpSpPr>
+        <p:cNvPr id="1" name=""/>
+        <p:cNvGrpSpPr/>
+        <p:nvPr/>
+      </p:nvGrpSpPr>
+      <p:grpSpPr>
+        <a:xfrm>
+          <a:off x="0" y="0"/>
+          <a:ext cx="0" cy="0"/>
+          <a:chOff x="0" y="0"/>
+          <a:chExt cx="0" cy="0"/>
+        </a:xfrm>
+      </p:grpSpPr>
+      <p:sp>
+        <p:nvSpPr>
+          <p:cNvPr id="2" name="Title 1"/>
+          <p:cNvSpPr>
+            <a:spLocks noGrp="1"/>
+          </p:cNvSpPr>
+          <p:nvPr>
+            <p:ph type="title"/>
+          </p:nvPr>
+        </p:nvSpPr>
+        <p:spPr/>
+        <p:txBody>
+          <a:bodyPr/>
+          <a:lstStyle/>
+          <a:p>
+            <a:r>
+              <a:rPr lang="en-US" dirty="0" smtClean="0"/>
+              <a:t>Ingredients</a:t>
+            </a:r>
+            <a:endParaRPr lang="en-US" dirty="0"/>
+          </a:p>
+        </p:txBody>
+      </p:sp>
+      <p:sp>
+        <p:nvSpPr>
+          <p:cNvPr id="3" name="Content Placeholder 2"/>
+          <p:cNvSpPr>
+            <a:spLocks noGrp="1"/>
+          </p:cNvSpPr>
+          <p:nvPr>
+            <p:ph idx="1"/>
+          </p:nvPr>
+        </p:nvSpPr>
+        <p:spPr/>
+        <p:txBody>
+          <a:bodyPr/>
+          <a:lstStyle/>
+          <a:p>
+            <a:r>
+              <a:rPr lang="en-US" dirty="0" smtClean="0"/>
+              <a:t>Beacons for location and context</a:t>
+            </a:r>
+          </a:p>
+          <a:p>
+            <a:r>
+              <a:rPr lang="en-US" dirty="0" err="1" smtClean="0"/>
+              <a:t>Brillo</a:t>
+            </a:r>
+            <a:r>
+              <a:rPr lang="en-US" dirty="0" smtClean="0"/>
+              <a:t>-Weave duo for tracking footfall</a:t>
+            </a:r>
+          </a:p>
+          <a:p>
+            <a:r>
+              <a:rPr lang="en-US" dirty="0" smtClean="0"/>
+              <a:t>Cloud service to manage our data</a:t>
+            </a:r>
+          </a:p>
+          <a:p>
+            <a:r>
+              <a:rPr lang="en-US" dirty="0" smtClean="0"/>
+              <a:t>Mobile app as a user interface</a:t>
+            </a:r>
+            <a:endParaRPr lang="en-US" dirty="0"/>
+          </a:p>
+        </p:txBody>
+      </p:sp>
+    </p:spTree>
+    <p:extLst>
+      <p:ext uri="{BB962C8B-B14F-4D97-AF65-F5344CB8AC3E}">
+        <p14:creationId xmlns:p14="http://schemas.microsoft.com/office/powerpoint/2010/main" val="298289409"/>
+      </p:ext>
+    </p:extLst>
+  </p:cSld>
+  <p:clrMapOvr>
+    <a:masterClrMapping/>
+  </p:clrMapOvr>
+</p:sld>
+</file>
+
+<file path=ppt/slides/slide5.xml><?xml version="1.0" encoding="utf-8"?>
+<p:sld xmlns:a="http://schemas.openxmlformats.org/drawingml/2006/main" xmlns:r="http://schemas.openxmlformats.org/officeDocument/2006/relationships" xmlns:p="http://schemas.openxmlformats.org/presentationml/2006/main">
+  <p:cSld>
+    <p:spTree>
+      <p:nvGrpSpPr>
+        <p:cNvPr id="1" name=""/>
+        <p:cNvGrpSpPr/>
+        <p:nvPr/>
+      </p:nvGrpSpPr>
+      <p:grpSpPr>
+        <a:xfrm>
+          <a:off x="0" y="0"/>
+          <a:ext cx="0" cy="0"/>
+          <a:chOff x="0" y="0"/>
+          <a:chExt cx="0" cy="0"/>
+        </a:xfrm>
+      </p:grpSpPr>
+      <p:sp>
+        <p:nvSpPr>
+          <p:cNvPr id="2" name="Title 1"/>
+          <p:cNvSpPr>
+            <a:spLocks noGrp="1"/>
+          </p:cNvSpPr>
+          <p:nvPr>
+            <p:ph type="title"/>
+          </p:nvPr>
+        </p:nvSpPr>
+        <p:spPr/>
+        <p:txBody>
+          <a:bodyPr/>
+          <a:lstStyle/>
+          <a:p>
+            <a:r>
+              <a:rPr lang="en-US" dirty="0" smtClean="0"/>
+              <a:t>Architecture</a:t>
+            </a:r>
+            <a:endParaRPr lang="en-US" dirty="0"/>
+          </a:p>
+        </p:txBody>
+      </p:sp>
+      <p:sp>
+        <p:nvSpPr>
+          <p:cNvPr id="3" name="Content Placeholder 2"/>
+          <p:cNvSpPr>
+            <a:spLocks noGrp="1"/>
+          </p:cNvSpPr>
+          <p:nvPr>
+            <p:ph idx="1"/>
+          </p:nvPr>
+        </p:nvSpPr>
+        <p:spPr/>
+        <p:txBody>
+          <a:bodyPr/>
+          <a:lstStyle/>
+          <a:p>
+            <a:endParaRPr lang="en-US"/>
+          </a:p>
+        </p:txBody>
+      </p:sp>
+    </p:spTree>
+    <p:extLst>
+      <p:ext uri="{BB962C8B-B14F-4D97-AF65-F5344CB8AC3E}">
+        <p14:creationId xmlns:p14="http://schemas.microsoft.com/office/powerpoint/2010/main" val="1624479069"/>
+      </p:ext>
+    </p:extLst>
+  </p:cSld>
+  <p:clrMapOvr>
+    <a:masterClrMapping/>
+  </p:clrMapOvr>
+</p:sld>
+</file>
+
+<file path=ppt/slides/slide6.xml><?xml version="1.0" encoding="utf-8"?>
+<p:sld xmlns:a="http://schemas.openxmlformats.org/drawingml/2006/main" xmlns:r="http://schemas.openxmlformats.org/officeDocument/2006/relationships" xmlns:p="http://schemas.openxmlformats.org/presentationml/2006/main">
+  <p:cSld>
+    <p:spTree>
+      <p:nvGrpSpPr>
+        <p:cNvPr id="1" name=""/>
+        <p:cNvGrpSpPr/>
+        <p:nvPr/>
+      </p:nvGrpSpPr>
+      <p:grpSpPr>
+        <a:xfrm>
+          <a:off x="0" y="0"/>
+          <a:ext cx="0" cy="0"/>
+          <a:chOff x="0" y="0"/>
+          <a:chExt cx="0" cy="0"/>
+        </a:xfrm>
+      </p:grpSpPr>
+      <p:sp>
+        <p:nvSpPr>
+          <p:cNvPr id="2" name="Title 1"/>
+          <p:cNvSpPr>
+            <a:spLocks noGrp="1"/>
+          </p:cNvSpPr>
+          <p:nvPr>
+            <p:ph type="title"/>
+          </p:nvPr>
+        </p:nvSpPr>
+        <p:spPr/>
+        <p:txBody>
+          <a:bodyPr/>
+          <a:lstStyle/>
+          <a:p>
+            <a:r>
+              <a:rPr lang="en-US" dirty="0" smtClean="0"/>
+              <a:t>Status</a:t>
+            </a:r>
+            <a:endParaRPr lang="en-US" dirty="0"/>
+          </a:p>
+        </p:txBody>
+      </p:sp>
+      <p:graphicFrame>
+        <p:nvGraphicFramePr>
+          <p:cNvPr id="6" name="Content Placeholder 5"/>
+          <p:cNvGraphicFramePr>
+            <a:graphicFrameLocks noGrp="1"/>
+          </p:cNvGraphicFramePr>
+          <p:nvPr>
+            <p:ph sz="half" idx="1"/>
+            <p:extLst>
+              <p:ext uri="{D42A27DB-BD31-4B8C-83A1-F6EECF244321}">
+                <p14:modId xmlns:p14="http://schemas.microsoft.com/office/powerpoint/2010/main" val="1444366017"/>
+              </p:ext>
+            </p:extLst>
+          </p:nvPr>
+        </p:nvGraphicFramePr>
+        <p:xfrm>
+          <a:off x="457200" y="1536699"/>
+          <a:ext cx="7288212" cy="4185227"/>
+        </p:xfrm>
+        <a:graphic>
+          <a:graphicData uri="http://schemas.openxmlformats.org/drawingml/2006/table">
+            <a:tbl>
+              <a:tblPr firstRow="1" bandRow="1">
+                <a:tableStyleId>{5C22544A-7EE6-4342-B048-85BDC9FD1C3A}</a:tableStyleId>
+              </a:tblPr>
+              <a:tblGrid>
+                <a:gridCol w="2429404">
+                  <a:extLst>
+                    <a:ext uri="{9D8B030D-6E8A-4147-A177-3AD203B41FA5}">
+                      <a16:colId xmlns:a16="http://schemas.microsoft.com/office/drawing/2014/main" val="2743192451"/>
+                    </a:ext>
+                  </a:extLst>
+                </a:gridCol>
+                <a:gridCol w="2429404">
+                  <a:extLst>
+                    <a:ext uri="{9D8B030D-6E8A-4147-A177-3AD203B41FA5}">
+                      <a16:colId xmlns:a16="http://schemas.microsoft.com/office/drawing/2014/main" val="2284893646"/>
+                    </a:ext>
+                  </a:extLst>
+                </a:gridCol>
+                <a:gridCol w="2429404">
+                  <a:extLst>
+                    <a:ext uri="{9D8B030D-6E8A-4147-A177-3AD203B41FA5}">
+                      <a16:colId xmlns:a16="http://schemas.microsoft.com/office/drawing/2014/main" val="1513409434"/>
+                    </a:ext>
+                  </a:extLst>
+                </a:gridCol>
+              </a:tblGrid>
+              <a:tr h="446017">
+                <a:tc>
+                  <a:txBody>
+                    <a:bodyPr/>
+                    <a:lstStyle/>
+                    <a:p>
+                      <a:r>
+                        <a:rPr lang="en-US" dirty="0" smtClean="0"/>
+                        <a:t>COMPONENT</a:t>
+                      </a:r>
+                      <a:endParaRPr lang="en-US" dirty="0"/>
+                    </a:p>
+                  </a:txBody>
+                  <a:tcPr/>
+                </a:tc>
+                <a:tc>
+                  <a:txBody>
+                    <a:bodyPr/>
+                    <a:lstStyle/>
+                    <a:p>
+                      <a:r>
+                        <a:rPr lang="en-US" dirty="0" smtClean="0"/>
+                        <a:t>COMPLETED</a:t>
+                      </a:r>
+                      <a:endParaRPr lang="en-US" dirty="0"/>
+                    </a:p>
+                  </a:txBody>
+                  <a:tcPr/>
+                </a:tc>
+                <a:tc>
+                  <a:txBody>
+                    <a:bodyPr/>
+                    <a:lstStyle/>
+                    <a:p>
+                      <a:r>
+                        <a:rPr lang="en-US" dirty="0" smtClean="0"/>
+                        <a:t>PENDING</a:t>
+                      </a:r>
+                      <a:endParaRPr lang="en-US" dirty="0"/>
+                    </a:p>
+                  </a:txBody>
+                  <a:tcPr/>
+                </a:tc>
+                <a:extLst>
+                  <a:ext uri="{0D108BD9-81ED-4DB2-BD59-A6C34878D82A}">
+                    <a16:rowId xmlns:a16="http://schemas.microsoft.com/office/drawing/2014/main" val="4236738760"/>
+                  </a:ext>
+                </a:extLst>
+              </a:tr>
+              <a:tr h="1099768">
+                <a:tc>
+                  <a:txBody>
+                    <a:bodyPr/>
+                    <a:lstStyle/>
+                    <a:p>
+                      <a:r>
+                        <a:rPr lang="en-US" dirty="0" smtClean="0"/>
+                        <a:t>BEACONS</a:t>
+                      </a:r>
+                      <a:endParaRPr lang="en-US" dirty="0"/>
+                    </a:p>
+                  </a:txBody>
+                  <a:tcPr/>
+                </a:tc>
+                <a:tc>
+                  <a:txBody>
+                    <a:bodyPr/>
+                    <a:lstStyle/>
+                    <a:p>
+                      <a:r>
+                        <a:rPr lang="en-US" dirty="0" smtClean="0"/>
+                        <a:t>Room data associated with attachments successfully</a:t>
+                      </a:r>
+                      <a:endParaRPr lang="en-US" dirty="0"/>
+                    </a:p>
+                  </a:txBody>
+                  <a:tcPr/>
+                </a:tc>
+                <a:tc>
+                  <a:txBody>
+                    <a:bodyPr/>
+                    <a:lstStyle/>
+                    <a:p>
+                      <a:r>
+                        <a:rPr lang="en-US" dirty="0" smtClean="0"/>
+                        <a:t>Common space beacons – would need more</a:t>
+                      </a:r>
+                      <a:endParaRPr lang="en-US" dirty="0"/>
+                    </a:p>
+                  </a:txBody>
+                  <a:tcPr/>
+                </a:tc>
+                <a:extLst>
+                  <a:ext uri="{0D108BD9-81ED-4DB2-BD59-A6C34878D82A}">
+                    <a16:rowId xmlns:a16="http://schemas.microsoft.com/office/drawing/2014/main" val="2893823940"/>
+                  </a:ext>
+                </a:extLst>
+              </a:tr>
+              <a:tr h="769837">
+                <a:tc>
+                  <a:txBody>
+                    <a:bodyPr/>
+                    <a:lstStyle/>
+                    <a:p>
+                      <a:r>
+                        <a:rPr lang="en-US" dirty="0" smtClean="0"/>
+                        <a:t>BRILLO-WEAVE </a:t>
+                      </a:r>
+                      <a:endParaRPr lang="en-US" dirty="0"/>
+                    </a:p>
+                  </a:txBody>
+                  <a:tcPr/>
+                </a:tc>
+                <a:tc>
+                  <a:txBody>
+                    <a:bodyPr/>
+                    <a:lstStyle/>
+                    <a:p>
+                      <a:r>
+                        <a:rPr lang="en-US" dirty="0" smtClean="0"/>
+                        <a:t>Integration of our cloud service with Weave</a:t>
+                      </a:r>
+                      <a:endParaRPr lang="en-US" dirty="0"/>
+                    </a:p>
+                  </a:txBody>
+                  <a:tcPr/>
+                </a:tc>
+                <a:tc>
+                  <a:txBody>
+                    <a:bodyPr/>
+                    <a:lstStyle/>
+                    <a:p>
+                      <a:r>
+                        <a:rPr lang="en-US" dirty="0" smtClean="0"/>
+                        <a:t>Hardware sensors instead</a:t>
+                      </a:r>
+                      <a:r>
+                        <a:rPr lang="en-US" baseline="0" dirty="0" smtClean="0"/>
+                        <a:t> of mocked data</a:t>
+                      </a:r>
+                      <a:endParaRPr lang="en-US" dirty="0"/>
+                    </a:p>
+                  </a:txBody>
+                  <a:tcPr/>
+                </a:tc>
+                <a:extLst>
+                  <a:ext uri="{0D108BD9-81ED-4DB2-BD59-A6C34878D82A}">
+                    <a16:rowId xmlns:a16="http://schemas.microsoft.com/office/drawing/2014/main" val="3873303208"/>
+                  </a:ext>
+                </a:extLst>
+              </a:tr>
+              <a:tr h="769837">
+                <a:tc>
+                  <a:txBody>
+                    <a:bodyPr/>
+                    <a:lstStyle/>
+                    <a:p>
+                      <a:r>
+                        <a:rPr lang="en-US" dirty="0" smtClean="0"/>
+                        <a:t>CLOUD SERVICE</a:t>
+                      </a:r>
+                      <a:endParaRPr lang="en-US" dirty="0"/>
+                    </a:p>
+                  </a:txBody>
+                  <a:tcPr/>
+                </a:tc>
+                <a:tc>
+                  <a:txBody>
+                    <a:bodyPr/>
+                    <a:lstStyle/>
+                    <a:p>
+                      <a:r>
+                        <a:rPr lang="en-US" dirty="0" smtClean="0"/>
+                        <a:t>Providing all the APIs</a:t>
+                      </a:r>
+                      <a:r>
+                        <a:rPr lang="en-US" baseline="0" dirty="0" smtClean="0"/>
+                        <a:t> currently required</a:t>
+                      </a:r>
+                      <a:endParaRPr lang="en-US" dirty="0"/>
+                    </a:p>
+                  </a:txBody>
+                  <a:tcPr/>
+                </a:tc>
+                <a:tc>
+                  <a:txBody>
+                    <a:bodyPr/>
+                    <a:lstStyle/>
+                    <a:p>
+                      <a:r>
+                        <a:rPr lang="en-US" dirty="0" smtClean="0"/>
+                        <a:t>Performance tuning for cost efficiency</a:t>
+                      </a:r>
+                      <a:endParaRPr lang="en-US" dirty="0"/>
+                    </a:p>
+                  </a:txBody>
+                  <a:tcPr/>
+                </a:tc>
+                <a:extLst>
+                  <a:ext uri="{0D108BD9-81ED-4DB2-BD59-A6C34878D82A}">
+                    <a16:rowId xmlns:a16="http://schemas.microsoft.com/office/drawing/2014/main" val="213650638"/>
+                  </a:ext>
+                </a:extLst>
+              </a:tr>
+              <a:tr h="1099768">
+                <a:tc>
+                  <a:txBody>
+                    <a:bodyPr/>
+                    <a:lstStyle/>
+                    <a:p>
+                      <a:r>
+                        <a:rPr lang="en-US" dirty="0" smtClean="0"/>
+                        <a:t>MOBILE APP</a:t>
+                      </a:r>
+                      <a:endParaRPr lang="en-US" dirty="0"/>
+                    </a:p>
+                  </a:txBody>
+                  <a:tcPr/>
+                </a:tc>
+                <a:tc>
+                  <a:txBody>
+                    <a:bodyPr/>
+                    <a:lstStyle/>
+                    <a:p>
+                      <a:r>
+                        <a:rPr lang="en-US" dirty="0" smtClean="0"/>
+                        <a:t>Providing the visualized functionalities as expected</a:t>
+                      </a:r>
+                      <a:endParaRPr lang="en-US" dirty="0"/>
+                    </a:p>
+                  </a:txBody>
+                  <a:tcPr/>
+                </a:tc>
+                <a:tc>
+                  <a:txBody>
+                    <a:bodyPr/>
+                    <a:lstStyle/>
+                    <a:p>
+                      <a:r>
+                        <a:rPr lang="en-US" dirty="0" smtClean="0"/>
+                        <a:t>UX enhancements to improve ease of use</a:t>
+                      </a:r>
+                      <a:endParaRPr lang="en-US" dirty="0"/>
+                    </a:p>
+                  </a:txBody>
+                  <a:tcPr/>
+                </a:tc>
+                <a:extLst>
+                  <a:ext uri="{0D108BD9-81ED-4DB2-BD59-A6C34878D82A}">
+                    <a16:rowId xmlns:a16="http://schemas.microsoft.com/office/drawing/2014/main" val="286267141"/>
+                  </a:ext>
+                </a:extLst>
+              </a:tr>
+            </a:tbl>
+          </a:graphicData>
+        </a:graphic>
+      </p:graphicFrame>
+    </p:spTree>
+    <p:extLst>
+      <p:ext uri="{BB962C8B-B14F-4D97-AF65-F5344CB8AC3E}">
+        <p14:creationId xmlns:p14="http://schemas.microsoft.com/office/powerpoint/2010/main" val="1120159846"/>
+      </p:ext>
+    </p:extLst>
+  </p:cSld>
+  <p:clrMapOvr>
+    <a:masterClrMapping/>
+  </p:clrMapOvr>
+</p:sld>
+</file>
+
+<file path=ppt/slides/slide7.xml><?xml version="1.0" encoding="utf-8"?>
+<p:sld xmlns:a="http://schemas.openxmlformats.org/drawingml/2006/main" xmlns:r="http://schemas.openxmlformats.org/officeDocument/2006/relationships" xmlns:p="http://schemas.openxmlformats.org/presentationml/2006/main">
+  <p:cSld>
+    <p:spTree>
+      <p:nvGrpSpPr>
+        <p:cNvPr id="1" name=""/>
+        <p:cNvGrpSpPr/>
+        <p:nvPr/>
+      </p:nvGrpSpPr>
+      <p:grpSpPr>
+        <a:xfrm>
+          <a:off x="0" y="0"/>
+          <a:ext cx="0" cy="0"/>
+          <a:chOff x="0" y="0"/>
+          <a:chExt cx="0" cy="0"/>
+        </a:xfrm>
+      </p:grpSpPr>
+      <p:sp>
+        <p:nvSpPr>
+          <p:cNvPr id="2" name="Title 1"/>
+          <p:cNvSpPr>
+            <a:spLocks noGrp="1"/>
+          </p:cNvSpPr>
+          <p:nvPr>
+            <p:ph type="title"/>
+          </p:nvPr>
+        </p:nvSpPr>
+        <p:spPr/>
+        <p:txBody>
+          <a:bodyPr/>
+          <a:lstStyle/>
+          <a:p>
+            <a:r>
+              <a:rPr lang="en-US" dirty="0" smtClean="0"/>
+              <a:t>Can we make money</a:t>
+            </a:r>
+            <a:endParaRPr lang="en-US" dirty="0"/>
+          </a:p>
+        </p:txBody>
+      </p:sp>
+      <p:sp>
+        <p:nvSpPr>
+          <p:cNvPr id="3" name="Content Placeholder 2"/>
+          <p:cNvSpPr>
+            <a:spLocks noGrp="1"/>
+          </p:cNvSpPr>
+          <p:nvPr>
+            <p:ph sz="half" idx="1"/>
+          </p:nvPr>
+        </p:nvSpPr>
+        <p:spPr>
+          <a:xfrm>
+            <a:off x="457199" y="1536192"/>
+            <a:ext cx="5805055" cy="4590288"/>
+          </a:xfrm>
+        </p:spPr>
+        <p:txBody>
+          <a:bodyPr/>
+          <a:lstStyle/>
+          <a:p>
+            <a:r>
+              <a:rPr lang="en-US" dirty="0" smtClean="0"/>
+              <a:t>Not straightforward, but YES!</a:t>
+            </a:r>
+          </a:p>
+          <a:p>
+            <a:r>
+              <a:rPr lang="en-US" dirty="0" smtClean="0"/>
+              <a:t>Enhances user experience</a:t>
+            </a:r>
+          </a:p>
+          <a:p>
+            <a:r>
+              <a:rPr lang="en-US" dirty="0" smtClean="0"/>
+              <a:t>Not limited to a library</a:t>
+            </a:r>
+          </a:p>
+          <a:p>
+            <a:r>
+              <a:rPr lang="en-US" dirty="0" smtClean="0"/>
+              <a:t>Parks</a:t>
+            </a:r>
+          </a:p>
+          <a:p>
+            <a:r>
+              <a:rPr lang="en-US" dirty="0" smtClean="0"/>
+              <a:t>Conferences</a:t>
+            </a:r>
+          </a:p>
+          <a:p>
+            <a:r>
+              <a:rPr lang="en-US" dirty="0" smtClean="0"/>
+              <a:t>Wedding halls</a:t>
+            </a:r>
+          </a:p>
+          <a:p>
+            <a:r>
+              <a:rPr lang="en-US" dirty="0" smtClean="0"/>
+              <a:t>Public spaces need it</a:t>
+            </a:r>
+            <a:endParaRPr lang="en-US" dirty="0"/>
+          </a:p>
+        </p:txBody>
+      </p:sp>
+      <p:pic>
+        <p:nvPicPr>
+          <p:cNvPr id="5" name="Content Placeholder 4"/>
+          <p:cNvPicPr>
+            <a:picLocks noGrp="1" noChangeAspect="1"/>
+          </p:cNvPicPr>
+          <p:nvPr>
+            <p:ph sz="half" idx="2"/>
+          </p:nvPr>
+        </p:nvPicPr>
+        <p:blipFill>
+          <a:blip r:embed="rId2">
+            <a:extLst>
+              <a:ext uri="{28A0092B-C50C-407E-A947-70E740481C1C}">
+                <a14:useLocalDpi xmlns:a14="http://schemas.microsoft.com/office/drawing/2010/main" val="0"/>
+              </a:ext>
+            </a:extLst>
+          </a:blip>
+          <a:stretch>
+            <a:fillRect/>
+          </a:stretch>
+        </p:blipFill>
+        <p:spPr>
+          <a:xfrm rot="20089253">
+            <a:off x="3973701" y="2612378"/>
+            <a:ext cx="4549787" cy="2811713"/>
+          </a:xfrm>
+        </p:spPr>
+      </p:pic>
+    </p:spTree>
+    <p:extLst>
+      <p:ext uri="{BB962C8B-B14F-4D97-AF65-F5344CB8AC3E}">
+        <p14:creationId xmlns:p14="http://schemas.microsoft.com/office/powerpoint/2010/main" val="2778982106"/>
+      </p:ext>
+    </p:extLst>
+  </p:cSld>
+  <p:clrMapOvr>
+    <a:masterClrMapping/>
+  </p:clrMapOvr>
+</p:sld>
+</file>
+
+<file path=ppt/slides/slide8.xml><?xml version="1.0" encoding="utf-8"?>
+<p:sld xmlns:a="http://schemas.openxmlformats.org/drawingml/2006/main" xmlns:r="http://schemas.openxmlformats.org/officeDocument/2006/relationships" xmlns:p="http://schemas.openxmlformats.org/presentationml/2006/main">
+  <p:cSld>
+    <p:spTree>
+      <p:nvGrpSpPr>
+        <p:cNvPr id="1" name=""/>
+        <p:cNvGrpSpPr/>
+        <p:nvPr/>
+      </p:nvGrpSpPr>
+      <p:grpSpPr>
+        <a:xfrm>
+          <a:off x="0" y="0"/>
+          <a:ext cx="0" cy="0"/>
+          <a:chOff x="0" y="0"/>
+          <a:chExt cx="0" cy="0"/>
+        </a:xfrm>
+      </p:grpSpPr>
+      <p:sp>
+        <p:nvSpPr>
+          <p:cNvPr id="2" name="Title 1"/>
+          <p:cNvSpPr>
+            <a:spLocks noGrp="1"/>
+          </p:cNvSpPr>
+          <p:nvPr>
+            <p:ph type="title"/>
+          </p:nvPr>
+        </p:nvSpPr>
+        <p:spPr/>
+        <p:txBody>
+          <a:bodyPr/>
+          <a:lstStyle/>
+          <a:p>
+            <a:r>
+              <a:rPr lang="en-US" dirty="0" smtClean="0"/>
+              <a:t>Click for video demo!</a:t>
+            </a:r>
+            <a:endParaRPr lang="en-US" dirty="0"/>
+          </a:p>
+        </p:txBody>
+      </p:sp>
+      <p:sp>
+        <p:nvSpPr>
+          <p:cNvPr id="3" name="Content Placeholder 2"/>
+          <p:cNvSpPr>
+            <a:spLocks noGrp="1"/>
+          </p:cNvSpPr>
+          <p:nvPr>
+            <p:ph sz="half" idx="1"/>
+          </p:nvPr>
+        </p:nvSpPr>
+        <p:spPr>
+          <a:xfrm>
+            <a:off x="457200" y="1536192"/>
+            <a:ext cx="7315200" cy="4590288"/>
+          </a:xfrm>
+        </p:spPr>
+        <p:txBody>
+          <a:bodyPr/>
+          <a:lstStyle/>
+          <a:p>
+            <a:r>
+              <a:rPr lang="en-US" u="sng" dirty="0">
+                <a:hlinkClick r:id="rId2"/>
+              </a:rPr>
+              <a:t>https://www.youtube.com/watch?v=8BuyhqfnH_c</a:t>
+            </a:r>
+            <a:endParaRPr lang="en-US" dirty="0"/>
+          </a:p>
+        </p:txBody>
+      </p:sp>
+    </p:spTree>
+    <p:extLst>
+      <p:ext uri="{BB962C8B-B14F-4D97-AF65-F5344CB8AC3E}">
+        <p14:creationId xmlns:p14="http://schemas.microsoft.com/office/powerpoint/2010/main" val="3748024543"/>
+      </p:ext>
+    </p:extLst>
+  </p:cSld>
+  <p:clrMapOvr>
+    <a:masterClrMapping/>
+  </p:clrMapOvr>
+</p:sld>
+</file>
+
+<file path=ppt/slides/slide9.xml><?xml version="1.0" encoding="utf-8"?>
+<p:sld xmlns:a="http://schemas.openxmlformats.org/drawingml/2006/main" xmlns:r="http://schemas.openxmlformats.org/officeDocument/2006/relationships" xmlns:p="http://schemas.openxmlformats.org/presentationml/2006/main">
+  <p:cSld>
+    <p:spTree>
+      <p:nvGrpSpPr>
+        <p:cNvPr id="1" name=""/>
+        <p:cNvGrpSpPr/>
+        <p:nvPr/>
+      </p:nvGrpSpPr>
+      <p:grpSpPr>
+        <a:xfrm>
+          <a:off x="0" y="0"/>
+          <a:ext cx="0" cy="0"/>
+          <a:chOff x="0" y="0"/>
+          <a:chExt cx="0" cy="0"/>
+        </a:xfrm>
+      </p:grpSpPr>
+      <p:sp>
+        <p:nvSpPr>
+          <p:cNvPr id="2" name="Title 1"/>
+          <p:cNvSpPr>
+            <a:spLocks noGrp="1"/>
+          </p:cNvSpPr>
+          <p:nvPr>
+            <p:ph type="title"/>
+          </p:nvPr>
+        </p:nvSpPr>
+        <p:spPr>
+          <a:xfrm>
+            <a:off x="2133600" y="2410692"/>
+            <a:ext cx="7620000" cy="1251383"/>
+          </a:xfrm>
+        </p:spPr>
+        <p:txBody>
+          <a:bodyPr/>
+          <a:lstStyle/>
+          <a:p>
+            <a:r>
+              <a:rPr lang="en-US" dirty="0" smtClean="0"/>
+              <a:t>THANK YOU!</a:t>
+            </a:r>
+            <a:endParaRPr lang="en-US" dirty="0"/>
+          </a:p>
+        </p:txBody>
+      </p:sp>
+    </p:spTree>
+    <p:extLst>
+      <p:ext uri="{BB962C8B-B14F-4D97-AF65-F5344CB8AC3E}">
+        <p14:creationId xmlns:p14="http://schemas.microsoft.com/office/powerpoint/2010/main" val="445557773"/>
       </p:ext>
     </p:extLst>
   </p:cSld>

</xml_diff>

<commit_message>
Final draft for ppt and report
</commit_message>
<xml_diff>
--- a/FinalPresentation.pptx
+++ b/FinalPresentation.pptx
@@ -3908,15 +3908,7 @@
             <a:pPr lvl="1"/>
             <a:r>
               <a:rPr lang="en-US" dirty="0" smtClean="0"/>
-              <a:t>Java </a:t>
-            </a:r>
-            <a:r>
-              <a:rPr lang="en-US" smtClean="0"/>
-              <a:t>Spring based API </a:t>
-            </a:r>
-            <a:r>
-              <a:rPr lang="en-US" dirty="0" smtClean="0"/>
-              <a:t>driven architecture</a:t>
+              <a:t>Java Spring based API driven architecture</a:t>
             </a:r>
           </a:p>
           <a:p>
@@ -5380,7 +5372,7 @@
             <p:ph sz="half" idx="1"/>
             <p:extLst>
               <p:ext uri="{D42A27DB-BD31-4B8C-83A1-F6EECF244321}">
-                <p14:modId xmlns:p14="http://schemas.microsoft.com/office/powerpoint/2010/main" val="1444366017"/>
+                <p14:modId xmlns:p14="http://schemas.microsoft.com/office/powerpoint/2010/main" val="2617398378"/>
               </p:ext>
             </p:extLst>
           </p:nvPr>
@@ -5658,7 +5650,7 @@
                     <a:p>
                       <a:r>
                         <a:rPr lang="en-US" dirty="0" smtClean="0"/>
-                        <a:t>UX enhancements to improve ease of use</a:t>
+                        <a:t>Social network integration</a:t>
                       </a:r>
                       <a:endParaRPr lang="en-US" dirty="0"/>
                     </a:p>
@@ -5895,10 +5887,8 @@
           <a:lstStyle/>
           <a:p>
             <a:r>
-              <a:rPr lang="en-US" u="sng" dirty="0">
-                <a:hlinkClick r:id="rId2"/>
-              </a:rPr>
-              <a:t>https://www.youtube.com/watch?v=8BuyhqfnH_c</a:t>
+              <a:rPr lang="en-US" dirty="0"/>
+              <a:t>https://www.youtube.com/watch?v=5EL35dluXF8&amp;feature=youtu.be</a:t>
             </a:r>
             <a:endParaRPr lang="en-US" dirty="0"/>
           </a:p>

</xml_diff>